<commit_message>
Start fixing broken links
</commit_message>
<xml_diff>
--- a/cover.pptx
+++ b/cover.pptx
@@ -3218,6 +3218,43 @@
           </a:prstGeom>
         </p:spPr>
       </p:pic>
+      <p:sp>
+        <p:nvSpPr>
+          <p:cNvPr id="3" name="TextBox 2"/>
+          <p:cNvSpPr txBox="1"/>
+          <p:nvPr/>
+        </p:nvSpPr>
+        <p:spPr>
+          <a:xfrm>
+            <a:off x="508000" y="8661400"/>
+            <a:ext cx="5835650" cy="338554"/>
+          </a:xfrm>
+          <a:prstGeom prst="rect">
+            <a:avLst/>
+          </a:prstGeom>
+          <a:noFill/>
+        </p:spPr>
+        <p:txBody>
+          <a:bodyPr wrap="square" rtlCol="0">
+            <a:spAutoFit/>
+          </a:bodyPr>
+          <a:lstStyle/>
+          <a:p>
+            <a:r>
+              <a:rPr lang="en-US" sz="800" dirty="0"/>
+              <a:t>This content was created by the Visual Studio ALM Rangers, a special group with members from the Visual Studio Product Team</a:t>
+            </a:r>
+            <a:r>
+              <a:rPr lang="en-US" sz="800" dirty="0" smtClean="0"/>
+              <a:t>, Microsoft </a:t>
+            </a:r>
+            <a:r>
+              <a:rPr lang="en-US" sz="800" dirty="0"/>
+              <a:t>Services, Microsoft Most Valuable Professionals (MVPs) and Visual Studio Community Leads.</a:t>
+            </a:r>
+          </a:p>
+        </p:txBody>
+      </p:sp>
     </p:spTree>
     <p:extLst>
       <p:ext uri="{BB962C8B-B14F-4D97-AF65-F5344CB8AC3E}">

</xml_diff>

<commit_message>
Update the version of the documentation in the cover to 1.1.0
</commit_message>
<xml_diff>
--- a/cover.pptx
+++ b/cover.pptx
@@ -3140,7 +3140,15 @@
             </a:br>
             <a:r>
               <a:rPr lang="fr-FR" sz="1400" dirty="0" smtClean="0"/>
-              <a:t>July 26, 2015 – V1.0.0</a:t>
+              <a:t>July 26, 2015 </a:t>
+            </a:r>
+            <a:r>
+              <a:rPr lang="fr-FR" sz="1400" smtClean="0"/>
+              <a:t>– </a:t>
+            </a:r>
+            <a:r>
+              <a:rPr lang="fr-FR" sz="1400" smtClean="0"/>
+              <a:t>V1.1.0</a:t>
             </a:r>
             <a:endParaRPr lang="en-US" sz="1400" dirty="0"/>
           </a:p>

</xml_diff>

<commit_message>
Updated cover etc for next release
</commit_message>
<xml_diff>
--- a/cover.pptx
+++ b/cover.pptx
@@ -104,6 +104,22 @@
       </a:defRPr>
     </a:lvl9pPr>
   </p:defaultTextStyle>
+  <p:extLst>
+    <p:ext uri="{EFAFB233-063F-42B5-8137-9DF3F51BA10A}">
+      <p15:sldGuideLst xmlns:p15="http://schemas.microsoft.com/office/powerpoint/2012/main">
+        <p15:guide id="1" orient="horz" pos="3120">
+          <p15:clr>
+            <a:srgbClr val="A4A3A4"/>
+          </p15:clr>
+        </p15:guide>
+        <p15:guide id="2" pos="2160">
+          <p15:clr>
+            <a:srgbClr val="A4A3A4"/>
+          </p15:clr>
+        </p15:guide>
+      </p15:sldGuideLst>
+    </p:ext>
+  </p:extLst>
 </p:presentation>
 </file>
 
@@ -288,7 +304,7 @@
           <a:p>
             <a:fld id="{655E4A62-C404-F346-8892-F71484014658}" type="datetimeFigureOut">
               <a:rPr lang="en-US" smtClean="0"/>
-              <a:t>26/07/15</a:t>
+              <a:t>9/4/2015</a:t>
             </a:fld>
             <a:endParaRPr lang="en-US"/>
           </a:p>
@@ -458,7 +474,7 @@
           <a:p>
             <a:fld id="{655E4A62-C404-F346-8892-F71484014658}" type="datetimeFigureOut">
               <a:rPr lang="en-US" smtClean="0"/>
-              <a:t>26/07/15</a:t>
+              <a:t>9/4/2015</a:t>
             </a:fld>
             <a:endParaRPr lang="en-US"/>
           </a:p>
@@ -638,7 +654,7 @@
           <a:p>
             <a:fld id="{655E4A62-C404-F346-8892-F71484014658}" type="datetimeFigureOut">
               <a:rPr lang="en-US" smtClean="0"/>
-              <a:t>26/07/15</a:t>
+              <a:t>9/4/2015</a:t>
             </a:fld>
             <a:endParaRPr lang="en-US"/>
           </a:p>
@@ -808,7 +824,7 @@
           <a:p>
             <a:fld id="{655E4A62-C404-F346-8892-F71484014658}" type="datetimeFigureOut">
               <a:rPr lang="en-US" smtClean="0"/>
-              <a:t>26/07/15</a:t>
+              <a:t>9/4/2015</a:t>
             </a:fld>
             <a:endParaRPr lang="en-US"/>
           </a:p>
@@ -1054,7 +1070,7 @@
           <a:p>
             <a:fld id="{655E4A62-C404-F346-8892-F71484014658}" type="datetimeFigureOut">
               <a:rPr lang="en-US" smtClean="0"/>
-              <a:t>26/07/15</a:t>
+              <a:t>9/4/2015</a:t>
             </a:fld>
             <a:endParaRPr lang="en-US"/>
           </a:p>
@@ -1342,7 +1358,7 @@
           <a:p>
             <a:fld id="{655E4A62-C404-F346-8892-F71484014658}" type="datetimeFigureOut">
               <a:rPr lang="en-US" smtClean="0"/>
-              <a:t>26/07/15</a:t>
+              <a:t>9/4/2015</a:t>
             </a:fld>
             <a:endParaRPr lang="en-US"/>
           </a:p>
@@ -1769,7 +1785,7 @@
           <a:p>
             <a:fld id="{655E4A62-C404-F346-8892-F71484014658}" type="datetimeFigureOut">
               <a:rPr lang="en-US" smtClean="0"/>
-              <a:t>26/07/15</a:t>
+              <a:t>9/4/2015</a:t>
             </a:fld>
             <a:endParaRPr lang="en-US"/>
           </a:p>
@@ -1887,7 +1903,7 @@
           <a:p>
             <a:fld id="{655E4A62-C404-F346-8892-F71484014658}" type="datetimeFigureOut">
               <a:rPr lang="en-US" smtClean="0"/>
-              <a:t>26/07/15</a:t>
+              <a:t>9/4/2015</a:t>
             </a:fld>
             <a:endParaRPr lang="en-US"/>
           </a:p>
@@ -1982,7 +1998,7 @@
           <a:p>
             <a:fld id="{655E4A62-C404-F346-8892-F71484014658}" type="datetimeFigureOut">
               <a:rPr lang="en-US" smtClean="0"/>
-              <a:t>26/07/15</a:t>
+              <a:t>9/4/2015</a:t>
             </a:fld>
             <a:endParaRPr lang="en-US"/>
           </a:p>
@@ -2259,7 +2275,7 @@
           <a:p>
             <a:fld id="{655E4A62-C404-F346-8892-F71484014658}" type="datetimeFigureOut">
               <a:rPr lang="en-US" smtClean="0"/>
-              <a:t>26/07/15</a:t>
+              <a:t>9/4/2015</a:t>
             </a:fld>
             <a:endParaRPr lang="en-US"/>
           </a:p>
@@ -2512,7 +2528,7 @@
           <a:p>
             <a:fld id="{655E4A62-C404-F346-8892-F71484014658}" type="datetimeFigureOut">
               <a:rPr lang="en-US" smtClean="0"/>
-              <a:t>26/07/15</a:t>
+              <a:t>9/4/2015</a:t>
             </a:fld>
             <a:endParaRPr lang="en-US"/>
           </a:p>
@@ -2725,7 +2741,7 @@
           <a:p>
             <a:fld id="{655E4A62-C404-F346-8892-F71484014658}" type="datetimeFigureOut">
               <a:rPr lang="en-US" smtClean="0"/>
-              <a:t>26/07/15</a:t>
+              <a:t>9/4/2015</a:t>
             </a:fld>
             <a:endParaRPr lang="en-US"/>
           </a:p>
@@ -3118,7 +3134,7 @@
         </p:spPr>
         <p:txBody>
           <a:bodyPr>
-            <a:normAutofit/>
+            <a:normAutofit fontScale="90000"/>
           </a:bodyPr>
           <a:lstStyle/>
           <a:p>
@@ -3140,15 +3156,56 @@
             </a:br>
             <a:r>
               <a:rPr lang="fr-FR" sz="1400" dirty="0" smtClean="0"/>
-              <a:t>July 26, 2015 </a:t>
-            </a:r>
-            <a:r>
-              <a:rPr lang="fr-FR" sz="1400" smtClean="0"/>
-              <a:t>– </a:t>
-            </a:r>
-            <a:r>
-              <a:rPr lang="fr-FR" sz="1400" smtClean="0"/>
-              <a:t>V1.1.0</a:t>
+              <a:t>4th </a:t>
+            </a:r>
+            <a:r>
+              <a:rPr lang="fr-FR" sz="1400" dirty="0" err="1" smtClean="0"/>
+              <a:t>September</a:t>
+            </a:r>
+            <a:r>
+              <a:rPr lang="fr-FR" sz="1400" dirty="0" smtClean="0"/>
+              <a:t>, </a:t>
+            </a:r>
+            <a:r>
+              <a:rPr lang="fr-FR" sz="1400" dirty="0" smtClean="0"/>
+              <a:t>2015 – </a:t>
+            </a:r>
+            <a:r>
+              <a:rPr lang="fr-FR" sz="1400" dirty="0" smtClean="0"/>
+              <a:t> doc version 1.2.0</a:t>
+            </a:r>
+            <a:br>
+              <a:rPr lang="fr-FR" sz="1400" dirty="0" smtClean="0"/>
+            </a:br>
+            <a:r>
+              <a:rPr lang="fr-FR" sz="1400" dirty="0" smtClean="0"/>
+              <a:t/>
+            </a:r>
+            <a:br>
+              <a:rPr lang="fr-FR" sz="1400" dirty="0" smtClean="0"/>
+            </a:br>
+            <a:r>
+              <a:rPr lang="fr-FR" sz="1400" dirty="0" smtClean="0"/>
+              <a:t/>
+            </a:r>
+            <a:br>
+              <a:rPr lang="fr-FR" sz="1400" dirty="0" smtClean="0"/>
+            </a:br>
+            <a:r>
+              <a:rPr lang="fr-FR" sz="1400" dirty="0" err="1" smtClean="0"/>
+              <a:t>Covers</a:t>
+            </a:r>
+            <a:r>
+              <a:rPr lang="fr-FR" sz="1400" dirty="0" smtClean="0"/>
+              <a:t> </a:t>
+            </a:r>
+            <a:r>
+              <a:rPr lang="fr-FR" sz="1400" i="1" dirty="0" err="1" smtClean="0"/>
+              <a:t>MSBuild.SonarQube.Runner</a:t>
+            </a:r>
+            <a:r>
+              <a:rPr lang="fr-FR" sz="1400" dirty="0" smtClean="0"/>
+              <a:t> v1.0.1</a:t>
             </a:r>
             <a:endParaRPr lang="en-US" sz="1400" dirty="0"/>
           </a:p>

</xml_diff>

<commit_message>
Updated cover and link releaes for 1.2.0
</commit_message>
<xml_diff>
--- a/cover.pptx
+++ b/cover.pptx
@@ -304,7 +304,7 @@
           <a:p>
             <a:fld id="{655E4A62-C404-F346-8892-F71484014658}" type="datetimeFigureOut">
               <a:rPr lang="en-US" smtClean="0"/>
-              <a:t>9/4/2015</a:t>
+              <a:t>9/8/2015</a:t>
             </a:fld>
             <a:endParaRPr lang="en-US"/>
           </a:p>
@@ -474,7 +474,7 @@
           <a:p>
             <a:fld id="{655E4A62-C404-F346-8892-F71484014658}" type="datetimeFigureOut">
               <a:rPr lang="en-US" smtClean="0"/>
-              <a:t>9/4/2015</a:t>
+              <a:t>9/8/2015</a:t>
             </a:fld>
             <a:endParaRPr lang="en-US"/>
           </a:p>
@@ -654,7 +654,7 @@
           <a:p>
             <a:fld id="{655E4A62-C404-F346-8892-F71484014658}" type="datetimeFigureOut">
               <a:rPr lang="en-US" smtClean="0"/>
-              <a:t>9/4/2015</a:t>
+              <a:t>9/8/2015</a:t>
             </a:fld>
             <a:endParaRPr lang="en-US"/>
           </a:p>
@@ -824,7 +824,7 @@
           <a:p>
             <a:fld id="{655E4A62-C404-F346-8892-F71484014658}" type="datetimeFigureOut">
               <a:rPr lang="en-US" smtClean="0"/>
-              <a:t>9/4/2015</a:t>
+              <a:t>9/8/2015</a:t>
             </a:fld>
             <a:endParaRPr lang="en-US"/>
           </a:p>
@@ -1070,7 +1070,7 @@
           <a:p>
             <a:fld id="{655E4A62-C404-F346-8892-F71484014658}" type="datetimeFigureOut">
               <a:rPr lang="en-US" smtClean="0"/>
-              <a:t>9/4/2015</a:t>
+              <a:t>9/8/2015</a:t>
             </a:fld>
             <a:endParaRPr lang="en-US"/>
           </a:p>
@@ -1358,7 +1358,7 @@
           <a:p>
             <a:fld id="{655E4A62-C404-F346-8892-F71484014658}" type="datetimeFigureOut">
               <a:rPr lang="en-US" smtClean="0"/>
-              <a:t>9/4/2015</a:t>
+              <a:t>9/8/2015</a:t>
             </a:fld>
             <a:endParaRPr lang="en-US"/>
           </a:p>
@@ -1785,7 +1785,7 @@
           <a:p>
             <a:fld id="{655E4A62-C404-F346-8892-F71484014658}" type="datetimeFigureOut">
               <a:rPr lang="en-US" smtClean="0"/>
-              <a:t>9/4/2015</a:t>
+              <a:t>9/8/2015</a:t>
             </a:fld>
             <a:endParaRPr lang="en-US"/>
           </a:p>
@@ -1903,7 +1903,7 @@
           <a:p>
             <a:fld id="{655E4A62-C404-F346-8892-F71484014658}" type="datetimeFigureOut">
               <a:rPr lang="en-US" smtClean="0"/>
-              <a:t>9/4/2015</a:t>
+              <a:t>9/8/2015</a:t>
             </a:fld>
             <a:endParaRPr lang="en-US"/>
           </a:p>
@@ -1998,7 +1998,7 @@
           <a:p>
             <a:fld id="{655E4A62-C404-F346-8892-F71484014658}" type="datetimeFigureOut">
               <a:rPr lang="en-US" smtClean="0"/>
-              <a:t>9/4/2015</a:t>
+              <a:t>9/8/2015</a:t>
             </a:fld>
             <a:endParaRPr lang="en-US"/>
           </a:p>
@@ -2275,7 +2275,7 @@
           <a:p>
             <a:fld id="{655E4A62-C404-F346-8892-F71484014658}" type="datetimeFigureOut">
               <a:rPr lang="en-US" smtClean="0"/>
-              <a:t>9/4/2015</a:t>
+              <a:t>9/8/2015</a:t>
             </a:fld>
             <a:endParaRPr lang="en-US"/>
           </a:p>
@@ -2528,7 +2528,7 @@
           <a:p>
             <a:fld id="{655E4A62-C404-F346-8892-F71484014658}" type="datetimeFigureOut">
               <a:rPr lang="en-US" smtClean="0"/>
-              <a:t>9/4/2015</a:t>
+              <a:t>9/8/2015</a:t>
             </a:fld>
             <a:endParaRPr lang="en-US"/>
           </a:p>
@@ -2741,7 +2741,7 @@
           <a:p>
             <a:fld id="{655E4A62-C404-F346-8892-F71484014658}" type="datetimeFigureOut">
               <a:rPr lang="en-US" smtClean="0"/>
-              <a:t>9/4/2015</a:t>
+              <a:t>9/8/2015</a:t>
             </a:fld>
             <a:endParaRPr lang="en-US"/>
           </a:p>
@@ -3148,15 +3148,15 @@
               <a:t> Setup Guide For .NET Users</a:t>
             </a:r>
             <a:r>
-              <a:rPr lang="en-US" dirty="0"/>
+              <a:rPr lang="en-US"/>
               <a:t/>
             </a:r>
             <a:br>
-              <a:rPr lang="en-US" dirty="0"/>
+              <a:rPr lang="en-US"/>
             </a:br>
             <a:r>
-              <a:rPr lang="fr-FR" sz="1400" dirty="0" smtClean="0"/>
-              <a:t>4th </a:t>
+              <a:rPr lang="fr-FR" sz="1400" smtClean="0"/>
+              <a:t>8th </a:t>
             </a:r>
             <a:r>
               <a:rPr lang="fr-FR" sz="1400" dirty="0" err="1" smtClean="0"/>
@@ -3164,15 +3164,7 @@
             </a:r>
             <a:r>
               <a:rPr lang="fr-FR" sz="1400" dirty="0" smtClean="0"/>
-              <a:t>, </a:t>
-            </a:r>
-            <a:r>
-              <a:rPr lang="fr-FR" sz="1400" dirty="0" smtClean="0"/>
-              <a:t>2015 – </a:t>
-            </a:r>
-            <a:r>
-              <a:rPr lang="fr-FR" sz="1400" dirty="0" smtClean="0"/>
-              <a:t> doc version 1.2.0</a:t>
+              <a:t>, 2015 –  doc version 1.2.0</a:t>
             </a:r>
             <a:br>
               <a:rPr lang="fr-FR" sz="1400" dirty="0" smtClean="0"/>

</xml_diff>

<commit_message>
Update cover for doc release 1.2.1 (MSBR release v1.0.2)
</commit_message>
<xml_diff>
--- a/cover.pptx
+++ b/cover.pptx
@@ -304,7 +304,7 @@
           <a:p>
             <a:fld id="{655E4A62-C404-F346-8892-F71484014658}" type="datetimeFigureOut">
               <a:rPr lang="en-US" smtClean="0"/>
-              <a:t>9/8/2015</a:t>
+              <a:t>10/21/2015</a:t>
             </a:fld>
             <a:endParaRPr lang="en-US"/>
           </a:p>
@@ -474,7 +474,7 @@
           <a:p>
             <a:fld id="{655E4A62-C404-F346-8892-F71484014658}" type="datetimeFigureOut">
               <a:rPr lang="en-US" smtClean="0"/>
-              <a:t>9/8/2015</a:t>
+              <a:t>10/21/2015</a:t>
             </a:fld>
             <a:endParaRPr lang="en-US"/>
           </a:p>
@@ -654,7 +654,7 @@
           <a:p>
             <a:fld id="{655E4A62-C404-F346-8892-F71484014658}" type="datetimeFigureOut">
               <a:rPr lang="en-US" smtClean="0"/>
-              <a:t>9/8/2015</a:t>
+              <a:t>10/21/2015</a:t>
             </a:fld>
             <a:endParaRPr lang="en-US"/>
           </a:p>
@@ -824,7 +824,7 @@
           <a:p>
             <a:fld id="{655E4A62-C404-F346-8892-F71484014658}" type="datetimeFigureOut">
               <a:rPr lang="en-US" smtClean="0"/>
-              <a:t>9/8/2015</a:t>
+              <a:t>10/21/2015</a:t>
             </a:fld>
             <a:endParaRPr lang="en-US"/>
           </a:p>
@@ -1070,7 +1070,7 @@
           <a:p>
             <a:fld id="{655E4A62-C404-F346-8892-F71484014658}" type="datetimeFigureOut">
               <a:rPr lang="en-US" smtClean="0"/>
-              <a:t>9/8/2015</a:t>
+              <a:t>10/21/2015</a:t>
             </a:fld>
             <a:endParaRPr lang="en-US"/>
           </a:p>
@@ -1358,7 +1358,7 @@
           <a:p>
             <a:fld id="{655E4A62-C404-F346-8892-F71484014658}" type="datetimeFigureOut">
               <a:rPr lang="en-US" smtClean="0"/>
-              <a:t>9/8/2015</a:t>
+              <a:t>10/21/2015</a:t>
             </a:fld>
             <a:endParaRPr lang="en-US"/>
           </a:p>
@@ -1785,7 +1785,7 @@
           <a:p>
             <a:fld id="{655E4A62-C404-F346-8892-F71484014658}" type="datetimeFigureOut">
               <a:rPr lang="en-US" smtClean="0"/>
-              <a:t>9/8/2015</a:t>
+              <a:t>10/21/2015</a:t>
             </a:fld>
             <a:endParaRPr lang="en-US"/>
           </a:p>
@@ -1903,7 +1903,7 @@
           <a:p>
             <a:fld id="{655E4A62-C404-F346-8892-F71484014658}" type="datetimeFigureOut">
               <a:rPr lang="en-US" smtClean="0"/>
-              <a:t>9/8/2015</a:t>
+              <a:t>10/21/2015</a:t>
             </a:fld>
             <a:endParaRPr lang="en-US"/>
           </a:p>
@@ -1998,7 +1998,7 @@
           <a:p>
             <a:fld id="{655E4A62-C404-F346-8892-F71484014658}" type="datetimeFigureOut">
               <a:rPr lang="en-US" smtClean="0"/>
-              <a:t>9/8/2015</a:t>
+              <a:t>10/21/2015</a:t>
             </a:fld>
             <a:endParaRPr lang="en-US"/>
           </a:p>
@@ -2275,7 +2275,7 @@
           <a:p>
             <a:fld id="{655E4A62-C404-F346-8892-F71484014658}" type="datetimeFigureOut">
               <a:rPr lang="en-US" smtClean="0"/>
-              <a:t>9/8/2015</a:t>
+              <a:t>10/21/2015</a:t>
             </a:fld>
             <a:endParaRPr lang="en-US"/>
           </a:p>
@@ -2528,7 +2528,7 @@
           <a:p>
             <a:fld id="{655E4A62-C404-F346-8892-F71484014658}" type="datetimeFigureOut">
               <a:rPr lang="en-US" smtClean="0"/>
-              <a:t>9/8/2015</a:t>
+              <a:t>10/21/2015</a:t>
             </a:fld>
             <a:endParaRPr lang="en-US"/>
           </a:p>
@@ -2741,7 +2741,7 @@
           <a:p>
             <a:fld id="{655E4A62-C404-F346-8892-F71484014658}" type="datetimeFigureOut">
               <a:rPr lang="en-US" smtClean="0"/>
-              <a:t>9/8/2015</a:t>
+              <a:t>10/21/2015</a:t>
             </a:fld>
             <a:endParaRPr lang="en-US"/>
           </a:p>
@@ -3148,23 +3148,23 @@
               <a:t> Setup Guide For .NET Users</a:t>
             </a:r>
             <a:r>
-              <a:rPr lang="en-US"/>
+              <a:rPr lang="en-US" dirty="0"/>
               <a:t/>
             </a:r>
             <a:br>
-              <a:rPr lang="en-US"/>
+              <a:rPr lang="en-US" dirty="0"/>
             </a:br>
             <a:r>
-              <a:rPr lang="fr-FR" sz="1400" smtClean="0"/>
-              <a:t>8th </a:t>
+              <a:rPr lang="fr-FR" sz="1400" dirty="0" smtClean="0"/>
+              <a:t>21st </a:t>
             </a:r>
             <a:r>
               <a:rPr lang="fr-FR" sz="1400" dirty="0" err="1" smtClean="0"/>
-              <a:t>September</a:t>
+              <a:t>November</a:t>
             </a:r>
             <a:r>
               <a:rPr lang="fr-FR" sz="1400" dirty="0" smtClean="0"/>
-              <a:t>, 2015 –  doc version 1.2.0</a:t>
+              <a:t>, 2015 –  doc version 1.2.1</a:t>
             </a:r>
             <a:br>
               <a:rPr lang="fr-FR" sz="1400" dirty="0" smtClean="0"/>
@@ -3197,7 +3197,7 @@
             </a:r>
             <a:r>
               <a:rPr lang="fr-FR" sz="1400" dirty="0" smtClean="0"/>
-              <a:t> v1.0.1</a:t>
+              <a:t> v1.0.2</a:t>
             </a:r>
             <a:endParaRPr lang="en-US" sz="1400" dirty="0"/>
           </a:p>

</xml_diff>

<commit_message>
Fix date on cover
</commit_message>
<xml_diff>
--- a/cover.pptx
+++ b/cover.pptx
@@ -304,7 +304,7 @@
           <a:p>
             <a:fld id="{655E4A62-C404-F346-8892-F71484014658}" type="datetimeFigureOut">
               <a:rPr lang="en-US" smtClean="0"/>
-              <a:t>10/21/2015</a:t>
+              <a:t>10/27/2015</a:t>
             </a:fld>
             <a:endParaRPr lang="en-US"/>
           </a:p>
@@ -474,7 +474,7 @@
           <a:p>
             <a:fld id="{655E4A62-C404-F346-8892-F71484014658}" type="datetimeFigureOut">
               <a:rPr lang="en-US" smtClean="0"/>
-              <a:t>10/21/2015</a:t>
+              <a:t>10/27/2015</a:t>
             </a:fld>
             <a:endParaRPr lang="en-US"/>
           </a:p>
@@ -654,7 +654,7 @@
           <a:p>
             <a:fld id="{655E4A62-C404-F346-8892-F71484014658}" type="datetimeFigureOut">
               <a:rPr lang="en-US" smtClean="0"/>
-              <a:t>10/21/2015</a:t>
+              <a:t>10/27/2015</a:t>
             </a:fld>
             <a:endParaRPr lang="en-US"/>
           </a:p>
@@ -824,7 +824,7 @@
           <a:p>
             <a:fld id="{655E4A62-C404-F346-8892-F71484014658}" type="datetimeFigureOut">
               <a:rPr lang="en-US" smtClean="0"/>
-              <a:t>10/21/2015</a:t>
+              <a:t>10/27/2015</a:t>
             </a:fld>
             <a:endParaRPr lang="en-US"/>
           </a:p>
@@ -1070,7 +1070,7 @@
           <a:p>
             <a:fld id="{655E4A62-C404-F346-8892-F71484014658}" type="datetimeFigureOut">
               <a:rPr lang="en-US" smtClean="0"/>
-              <a:t>10/21/2015</a:t>
+              <a:t>10/27/2015</a:t>
             </a:fld>
             <a:endParaRPr lang="en-US"/>
           </a:p>
@@ -1358,7 +1358,7 @@
           <a:p>
             <a:fld id="{655E4A62-C404-F346-8892-F71484014658}" type="datetimeFigureOut">
               <a:rPr lang="en-US" smtClean="0"/>
-              <a:t>10/21/2015</a:t>
+              <a:t>10/27/2015</a:t>
             </a:fld>
             <a:endParaRPr lang="en-US"/>
           </a:p>
@@ -1785,7 +1785,7 @@
           <a:p>
             <a:fld id="{655E4A62-C404-F346-8892-F71484014658}" type="datetimeFigureOut">
               <a:rPr lang="en-US" smtClean="0"/>
-              <a:t>10/21/2015</a:t>
+              <a:t>10/27/2015</a:t>
             </a:fld>
             <a:endParaRPr lang="en-US"/>
           </a:p>
@@ -1903,7 +1903,7 @@
           <a:p>
             <a:fld id="{655E4A62-C404-F346-8892-F71484014658}" type="datetimeFigureOut">
               <a:rPr lang="en-US" smtClean="0"/>
-              <a:t>10/21/2015</a:t>
+              <a:t>10/27/2015</a:t>
             </a:fld>
             <a:endParaRPr lang="en-US"/>
           </a:p>
@@ -1998,7 +1998,7 @@
           <a:p>
             <a:fld id="{655E4A62-C404-F346-8892-F71484014658}" type="datetimeFigureOut">
               <a:rPr lang="en-US" smtClean="0"/>
-              <a:t>10/21/2015</a:t>
+              <a:t>10/27/2015</a:t>
             </a:fld>
             <a:endParaRPr lang="en-US"/>
           </a:p>
@@ -2275,7 +2275,7 @@
           <a:p>
             <a:fld id="{655E4A62-C404-F346-8892-F71484014658}" type="datetimeFigureOut">
               <a:rPr lang="en-US" smtClean="0"/>
-              <a:t>10/21/2015</a:t>
+              <a:t>10/27/2015</a:t>
             </a:fld>
             <a:endParaRPr lang="en-US"/>
           </a:p>
@@ -2528,7 +2528,7 @@
           <a:p>
             <a:fld id="{655E4A62-C404-F346-8892-F71484014658}" type="datetimeFigureOut">
               <a:rPr lang="en-US" smtClean="0"/>
-              <a:t>10/21/2015</a:t>
+              <a:t>10/27/2015</a:t>
             </a:fld>
             <a:endParaRPr lang="en-US"/>
           </a:p>
@@ -2741,7 +2741,7 @@
           <a:p>
             <a:fld id="{655E4A62-C404-F346-8892-F71484014658}" type="datetimeFigureOut">
               <a:rPr lang="en-US" smtClean="0"/>
-              <a:t>10/21/2015</a:t>
+              <a:t>10/27/2015</a:t>
             </a:fld>
             <a:endParaRPr lang="en-US"/>
           </a:p>
@@ -3155,16 +3155,20 @@
               <a:rPr lang="en-US" dirty="0"/>
             </a:br>
             <a:r>
+              <a:rPr lang="fr-FR" sz="1400" smtClean="0"/>
+              <a:t>27th </a:t>
+            </a:r>
+            <a:r>
+              <a:rPr lang="fr-FR" sz="1400" dirty="0" err="1" smtClean="0"/>
+              <a:t>October</a:t>
+            </a:r>
+            <a:r>
               <a:rPr lang="fr-FR" sz="1400" dirty="0" smtClean="0"/>
-              <a:t>21st </a:t>
-            </a:r>
-            <a:r>
-              <a:rPr lang="fr-FR" sz="1400" dirty="0" err="1" smtClean="0"/>
-              <a:t>November</a:t>
+              <a:t>, </a:t>
             </a:r>
             <a:r>
               <a:rPr lang="fr-FR" sz="1400" dirty="0" smtClean="0"/>
-              <a:t>, 2015 –  doc version 1.2.1</a:t>
+              <a:t>2015 –  doc version 1.2.1</a:t>
             </a:r>
             <a:br>
               <a:rPr lang="fr-FR" sz="1400" dirty="0" smtClean="0"/>

</xml_diff>

<commit_message>
Update documentation cover for v1.1 release
</commit_message>
<xml_diff>
--- a/cover.pptx
+++ b/cover.pptx
@@ -304,7 +304,7 @@
           <a:p>
             <a:fld id="{655E4A62-C404-F346-8892-F71484014658}" type="datetimeFigureOut">
               <a:rPr lang="en-US" smtClean="0"/>
-              <a:t>10/27/2015</a:t>
+              <a:t>12/8/2015</a:t>
             </a:fld>
             <a:endParaRPr lang="en-US"/>
           </a:p>
@@ -474,7 +474,7 @@
           <a:p>
             <a:fld id="{655E4A62-C404-F346-8892-F71484014658}" type="datetimeFigureOut">
               <a:rPr lang="en-US" smtClean="0"/>
-              <a:t>10/27/2015</a:t>
+              <a:t>12/8/2015</a:t>
             </a:fld>
             <a:endParaRPr lang="en-US"/>
           </a:p>
@@ -654,7 +654,7 @@
           <a:p>
             <a:fld id="{655E4A62-C404-F346-8892-F71484014658}" type="datetimeFigureOut">
               <a:rPr lang="en-US" smtClean="0"/>
-              <a:t>10/27/2015</a:t>
+              <a:t>12/8/2015</a:t>
             </a:fld>
             <a:endParaRPr lang="en-US"/>
           </a:p>
@@ -824,7 +824,7 @@
           <a:p>
             <a:fld id="{655E4A62-C404-F346-8892-F71484014658}" type="datetimeFigureOut">
               <a:rPr lang="en-US" smtClean="0"/>
-              <a:t>10/27/2015</a:t>
+              <a:t>12/8/2015</a:t>
             </a:fld>
             <a:endParaRPr lang="en-US"/>
           </a:p>
@@ -1070,7 +1070,7 @@
           <a:p>
             <a:fld id="{655E4A62-C404-F346-8892-F71484014658}" type="datetimeFigureOut">
               <a:rPr lang="en-US" smtClean="0"/>
-              <a:t>10/27/2015</a:t>
+              <a:t>12/8/2015</a:t>
             </a:fld>
             <a:endParaRPr lang="en-US"/>
           </a:p>
@@ -1358,7 +1358,7 @@
           <a:p>
             <a:fld id="{655E4A62-C404-F346-8892-F71484014658}" type="datetimeFigureOut">
               <a:rPr lang="en-US" smtClean="0"/>
-              <a:t>10/27/2015</a:t>
+              <a:t>12/8/2015</a:t>
             </a:fld>
             <a:endParaRPr lang="en-US"/>
           </a:p>
@@ -1785,7 +1785,7 @@
           <a:p>
             <a:fld id="{655E4A62-C404-F346-8892-F71484014658}" type="datetimeFigureOut">
               <a:rPr lang="en-US" smtClean="0"/>
-              <a:t>10/27/2015</a:t>
+              <a:t>12/8/2015</a:t>
             </a:fld>
             <a:endParaRPr lang="en-US"/>
           </a:p>
@@ -1903,7 +1903,7 @@
           <a:p>
             <a:fld id="{655E4A62-C404-F346-8892-F71484014658}" type="datetimeFigureOut">
               <a:rPr lang="en-US" smtClean="0"/>
-              <a:t>10/27/2015</a:t>
+              <a:t>12/8/2015</a:t>
             </a:fld>
             <a:endParaRPr lang="en-US"/>
           </a:p>
@@ -1998,7 +1998,7 @@
           <a:p>
             <a:fld id="{655E4A62-C404-F346-8892-F71484014658}" type="datetimeFigureOut">
               <a:rPr lang="en-US" smtClean="0"/>
-              <a:t>10/27/2015</a:t>
+              <a:t>12/8/2015</a:t>
             </a:fld>
             <a:endParaRPr lang="en-US"/>
           </a:p>
@@ -2275,7 +2275,7 @@
           <a:p>
             <a:fld id="{655E4A62-C404-F346-8892-F71484014658}" type="datetimeFigureOut">
               <a:rPr lang="en-US" smtClean="0"/>
-              <a:t>10/27/2015</a:t>
+              <a:t>12/8/2015</a:t>
             </a:fld>
             <a:endParaRPr lang="en-US"/>
           </a:p>
@@ -2528,7 +2528,7 @@
           <a:p>
             <a:fld id="{655E4A62-C404-F346-8892-F71484014658}" type="datetimeFigureOut">
               <a:rPr lang="en-US" smtClean="0"/>
-              <a:t>10/27/2015</a:t>
+              <a:t>12/8/2015</a:t>
             </a:fld>
             <a:endParaRPr lang="en-US"/>
           </a:p>
@@ -2741,7 +2741,7 @@
           <a:p>
             <a:fld id="{655E4A62-C404-F346-8892-F71484014658}" type="datetimeFigureOut">
               <a:rPr lang="en-US" smtClean="0"/>
-              <a:t>10/27/2015</a:t>
+              <a:t>12/8/2015</a:t>
             </a:fld>
             <a:endParaRPr lang="en-US"/>
           </a:p>
@@ -3155,12 +3155,12 @@
               <a:rPr lang="en-US" dirty="0"/>
             </a:br>
             <a:r>
-              <a:rPr lang="fr-FR" sz="1400" smtClean="0"/>
-              <a:t>27th </a:t>
+              <a:rPr lang="fr-FR" sz="1400" dirty="0" smtClean="0"/>
+              <a:t>8th </a:t>
             </a:r>
             <a:r>
               <a:rPr lang="fr-FR" sz="1400" dirty="0" err="1" smtClean="0"/>
-              <a:t>October</a:t>
+              <a:t>December</a:t>
             </a:r>
             <a:r>
               <a:rPr lang="fr-FR" sz="1400" dirty="0" smtClean="0"/>
@@ -3168,7 +3168,15 @@
             </a:r>
             <a:r>
               <a:rPr lang="fr-FR" sz="1400" dirty="0" smtClean="0"/>
-              <a:t>2015 –  doc version 1.2.1</a:t>
+              <a:t>2015 –  doc version </a:t>
+            </a:r>
+            <a:r>
+              <a:rPr lang="fr-FR" sz="1400" dirty="0" smtClean="0"/>
+              <a:t>1.2.2</a:t>
+            </a:r>
+            <a:r>
+              <a:rPr lang="fr-FR" sz="1400" dirty="0" smtClean="0"/>
+              <a:t/>
             </a:r>
             <a:br>
               <a:rPr lang="fr-FR" sz="1400" dirty="0" smtClean="0"/>
@@ -3201,7 +3209,11 @@
             </a:r>
             <a:r>
               <a:rPr lang="fr-FR" sz="1400" dirty="0" smtClean="0"/>
-              <a:t> v1.0.2</a:t>
+              <a:t> </a:t>
+            </a:r>
+            <a:r>
+              <a:rPr lang="fr-FR" sz="1400" dirty="0" smtClean="0"/>
+              <a:t>v1.1</a:t>
             </a:r>
             <a:endParaRPr lang="en-US" sz="1400" dirty="0"/>
           </a:p>

</xml_diff>

<commit_message>
Updated cover to use new product name
</commit_message>
<xml_diff>
--- a/cover.pptx
+++ b/cover.pptx
@@ -304,7 +304,7 @@
           <a:p>
             <a:fld id="{655E4A62-C404-F346-8892-F71484014658}" type="datetimeFigureOut">
               <a:rPr lang="en-US" smtClean="0"/>
-              <a:t>12/8/2015</a:t>
+              <a:t>12/17/2015</a:t>
             </a:fld>
             <a:endParaRPr lang="en-US"/>
           </a:p>
@@ -474,7 +474,7 @@
           <a:p>
             <a:fld id="{655E4A62-C404-F346-8892-F71484014658}" type="datetimeFigureOut">
               <a:rPr lang="en-US" smtClean="0"/>
-              <a:t>12/8/2015</a:t>
+              <a:t>12/17/2015</a:t>
             </a:fld>
             <a:endParaRPr lang="en-US"/>
           </a:p>
@@ -654,7 +654,7 @@
           <a:p>
             <a:fld id="{655E4A62-C404-F346-8892-F71484014658}" type="datetimeFigureOut">
               <a:rPr lang="en-US" smtClean="0"/>
-              <a:t>12/8/2015</a:t>
+              <a:t>12/17/2015</a:t>
             </a:fld>
             <a:endParaRPr lang="en-US"/>
           </a:p>
@@ -824,7 +824,7 @@
           <a:p>
             <a:fld id="{655E4A62-C404-F346-8892-F71484014658}" type="datetimeFigureOut">
               <a:rPr lang="en-US" smtClean="0"/>
-              <a:t>12/8/2015</a:t>
+              <a:t>12/17/2015</a:t>
             </a:fld>
             <a:endParaRPr lang="en-US"/>
           </a:p>
@@ -1070,7 +1070,7 @@
           <a:p>
             <a:fld id="{655E4A62-C404-F346-8892-F71484014658}" type="datetimeFigureOut">
               <a:rPr lang="en-US" smtClean="0"/>
-              <a:t>12/8/2015</a:t>
+              <a:t>12/17/2015</a:t>
             </a:fld>
             <a:endParaRPr lang="en-US"/>
           </a:p>
@@ -1358,7 +1358,7 @@
           <a:p>
             <a:fld id="{655E4A62-C404-F346-8892-F71484014658}" type="datetimeFigureOut">
               <a:rPr lang="en-US" smtClean="0"/>
-              <a:t>12/8/2015</a:t>
+              <a:t>12/17/2015</a:t>
             </a:fld>
             <a:endParaRPr lang="en-US"/>
           </a:p>
@@ -1785,7 +1785,7 @@
           <a:p>
             <a:fld id="{655E4A62-C404-F346-8892-F71484014658}" type="datetimeFigureOut">
               <a:rPr lang="en-US" smtClean="0"/>
-              <a:t>12/8/2015</a:t>
+              <a:t>12/17/2015</a:t>
             </a:fld>
             <a:endParaRPr lang="en-US"/>
           </a:p>
@@ -1903,7 +1903,7 @@
           <a:p>
             <a:fld id="{655E4A62-C404-F346-8892-F71484014658}" type="datetimeFigureOut">
               <a:rPr lang="en-US" smtClean="0"/>
-              <a:t>12/8/2015</a:t>
+              <a:t>12/17/2015</a:t>
             </a:fld>
             <a:endParaRPr lang="en-US"/>
           </a:p>
@@ -1998,7 +1998,7 @@
           <a:p>
             <a:fld id="{655E4A62-C404-F346-8892-F71484014658}" type="datetimeFigureOut">
               <a:rPr lang="en-US" smtClean="0"/>
-              <a:t>12/8/2015</a:t>
+              <a:t>12/17/2015</a:t>
             </a:fld>
             <a:endParaRPr lang="en-US"/>
           </a:p>
@@ -2275,7 +2275,7 @@
           <a:p>
             <a:fld id="{655E4A62-C404-F346-8892-F71484014658}" type="datetimeFigureOut">
               <a:rPr lang="en-US" smtClean="0"/>
-              <a:t>12/8/2015</a:t>
+              <a:t>12/17/2015</a:t>
             </a:fld>
             <a:endParaRPr lang="en-US"/>
           </a:p>
@@ -2528,7 +2528,7 @@
           <a:p>
             <a:fld id="{655E4A62-C404-F346-8892-F71484014658}" type="datetimeFigureOut">
               <a:rPr lang="en-US" smtClean="0"/>
-              <a:t>12/8/2015</a:t>
+              <a:t>12/17/2015</a:t>
             </a:fld>
             <a:endParaRPr lang="en-US"/>
           </a:p>
@@ -2741,7 +2741,7 @@
           <a:p>
             <a:fld id="{655E4A62-C404-F346-8892-F71484014658}" type="datetimeFigureOut">
               <a:rPr lang="en-US" smtClean="0"/>
-              <a:t>12/8/2015</a:t>
+              <a:t>12/17/2015</a:t>
             </a:fld>
             <a:endParaRPr lang="en-US"/>
           </a:p>
@@ -3156,7 +3156,11 @@
             </a:br>
             <a:r>
               <a:rPr lang="fr-FR" sz="1400" dirty="0" smtClean="0"/>
-              <a:t>8th </a:t>
+              <a:t>17</a:t>
+            </a:r>
+            <a:r>
+              <a:rPr lang="fr-FR" sz="1400" dirty="0" smtClean="0"/>
+              <a:t>th </a:t>
             </a:r>
             <a:r>
               <a:rPr lang="fr-FR" sz="1400" dirty="0" err="1" smtClean="0"/>
@@ -3164,19 +3168,7 @@
             </a:r>
             <a:r>
               <a:rPr lang="fr-FR" sz="1400" dirty="0" smtClean="0"/>
-              <a:t>, </a:t>
-            </a:r>
-            <a:r>
-              <a:rPr lang="fr-FR" sz="1400" dirty="0" smtClean="0"/>
-              <a:t>2015 –  doc version </a:t>
-            </a:r>
-            <a:r>
-              <a:rPr lang="fr-FR" sz="1400" dirty="0" smtClean="0"/>
-              <a:t>1.2.2</a:t>
-            </a:r>
-            <a:r>
-              <a:rPr lang="fr-FR" sz="1400" dirty="0" smtClean="0"/>
-              <a:t/>
+              <a:t>, 2015 –  doc version 1.2.2</a:t>
             </a:r>
             <a:br>
               <a:rPr lang="fr-FR" sz="1400" dirty="0" smtClean="0"/>
@@ -3205,10 +3197,18 @@
             </a:r>
             <a:r>
               <a:rPr lang="fr-FR" sz="1400" i="1" dirty="0" err="1" smtClean="0"/>
-              <a:t>MSBuild.SonarQube.Runner</a:t>
-            </a:r>
-            <a:r>
-              <a:rPr lang="fr-FR" sz="1400" dirty="0" smtClean="0"/>
+              <a:t>SonarQube</a:t>
+            </a:r>
+            <a:r>
+              <a:rPr lang="fr-FR" sz="1400" i="1" dirty="0" smtClean="0"/>
+              <a:t> Scanner for </a:t>
+            </a:r>
+            <a:r>
+              <a:rPr lang="fr-FR" sz="1400" i="1" dirty="0" err="1" smtClean="0"/>
+              <a:t>MSBuild</a:t>
+            </a:r>
+            <a:r>
+              <a:rPr lang="fr-FR" sz="1400" i="1" dirty="0" smtClean="0"/>
               <a:t> </a:t>
             </a:r>
             <a:r>

</xml_diff>

<commit_message>
Updated docs to refer to SonarQube Scanner for MSBuild
</commit_message>
<xml_diff>
--- a/cover.pptx
+++ b/cover.pptx
@@ -304,7 +304,7 @@
           <a:p>
             <a:fld id="{655E4A62-C404-F346-8892-F71484014658}" type="datetimeFigureOut">
               <a:rPr lang="en-US" smtClean="0"/>
-              <a:t>12/17/2015</a:t>
+              <a:t>2/15/2016</a:t>
             </a:fld>
             <a:endParaRPr lang="en-US"/>
           </a:p>
@@ -474,7 +474,7 @@
           <a:p>
             <a:fld id="{655E4A62-C404-F346-8892-F71484014658}" type="datetimeFigureOut">
               <a:rPr lang="en-US" smtClean="0"/>
-              <a:t>12/17/2015</a:t>
+              <a:t>2/15/2016</a:t>
             </a:fld>
             <a:endParaRPr lang="en-US"/>
           </a:p>
@@ -654,7 +654,7 @@
           <a:p>
             <a:fld id="{655E4A62-C404-F346-8892-F71484014658}" type="datetimeFigureOut">
               <a:rPr lang="en-US" smtClean="0"/>
-              <a:t>12/17/2015</a:t>
+              <a:t>2/15/2016</a:t>
             </a:fld>
             <a:endParaRPr lang="en-US"/>
           </a:p>
@@ -824,7 +824,7 @@
           <a:p>
             <a:fld id="{655E4A62-C404-F346-8892-F71484014658}" type="datetimeFigureOut">
               <a:rPr lang="en-US" smtClean="0"/>
-              <a:t>12/17/2015</a:t>
+              <a:t>2/15/2016</a:t>
             </a:fld>
             <a:endParaRPr lang="en-US"/>
           </a:p>
@@ -1070,7 +1070,7 @@
           <a:p>
             <a:fld id="{655E4A62-C404-F346-8892-F71484014658}" type="datetimeFigureOut">
               <a:rPr lang="en-US" smtClean="0"/>
-              <a:t>12/17/2015</a:t>
+              <a:t>2/15/2016</a:t>
             </a:fld>
             <a:endParaRPr lang="en-US"/>
           </a:p>
@@ -1358,7 +1358,7 @@
           <a:p>
             <a:fld id="{655E4A62-C404-F346-8892-F71484014658}" type="datetimeFigureOut">
               <a:rPr lang="en-US" smtClean="0"/>
-              <a:t>12/17/2015</a:t>
+              <a:t>2/15/2016</a:t>
             </a:fld>
             <a:endParaRPr lang="en-US"/>
           </a:p>
@@ -1785,7 +1785,7 @@
           <a:p>
             <a:fld id="{655E4A62-C404-F346-8892-F71484014658}" type="datetimeFigureOut">
               <a:rPr lang="en-US" smtClean="0"/>
-              <a:t>12/17/2015</a:t>
+              <a:t>2/15/2016</a:t>
             </a:fld>
             <a:endParaRPr lang="en-US"/>
           </a:p>
@@ -1903,7 +1903,7 @@
           <a:p>
             <a:fld id="{655E4A62-C404-F346-8892-F71484014658}" type="datetimeFigureOut">
               <a:rPr lang="en-US" smtClean="0"/>
-              <a:t>12/17/2015</a:t>
+              <a:t>2/15/2016</a:t>
             </a:fld>
             <a:endParaRPr lang="en-US"/>
           </a:p>
@@ -1998,7 +1998,7 @@
           <a:p>
             <a:fld id="{655E4A62-C404-F346-8892-F71484014658}" type="datetimeFigureOut">
               <a:rPr lang="en-US" smtClean="0"/>
-              <a:t>12/17/2015</a:t>
+              <a:t>2/15/2016</a:t>
             </a:fld>
             <a:endParaRPr lang="en-US"/>
           </a:p>
@@ -2275,7 +2275,7 @@
           <a:p>
             <a:fld id="{655E4A62-C404-F346-8892-F71484014658}" type="datetimeFigureOut">
               <a:rPr lang="en-US" smtClean="0"/>
-              <a:t>12/17/2015</a:t>
+              <a:t>2/15/2016</a:t>
             </a:fld>
             <a:endParaRPr lang="en-US"/>
           </a:p>
@@ -2528,7 +2528,7 @@
           <a:p>
             <a:fld id="{655E4A62-C404-F346-8892-F71484014658}" type="datetimeFigureOut">
               <a:rPr lang="en-US" smtClean="0"/>
-              <a:t>12/17/2015</a:t>
+              <a:t>2/15/2016</a:t>
             </a:fld>
             <a:endParaRPr lang="en-US"/>
           </a:p>
@@ -2741,7 +2741,7 @@
           <a:p>
             <a:fld id="{655E4A62-C404-F346-8892-F71484014658}" type="datetimeFigureOut">
               <a:rPr lang="en-US" smtClean="0"/>
-              <a:t>12/17/2015</a:t>
+              <a:t>2/15/2016</a:t>
             </a:fld>
             <a:endParaRPr lang="en-US"/>
           </a:p>
@@ -3156,19 +3156,27 @@
             </a:br>
             <a:r>
               <a:rPr lang="fr-FR" sz="1400" dirty="0" smtClean="0"/>
-              <a:t>17</a:t>
+              <a:t>15th </a:t>
+            </a:r>
+            <a:r>
+              <a:rPr lang="fr-FR" sz="1400" dirty="0" err="1" smtClean="0"/>
+              <a:t>February</a:t>
             </a:r>
             <a:r>
               <a:rPr lang="fr-FR" sz="1400" dirty="0" smtClean="0"/>
-              <a:t>th </a:t>
-            </a:r>
-            <a:r>
-              <a:rPr lang="fr-FR" sz="1400" dirty="0" err="1" smtClean="0"/>
-              <a:t>December</a:t>
+              <a:t>, </a:t>
             </a:r>
             <a:r>
               <a:rPr lang="fr-FR" sz="1400" dirty="0" smtClean="0"/>
-              <a:t>, 2015 –  doc version 1.2.2</a:t>
+              <a:t>2015 –  doc version </a:t>
+            </a:r>
+            <a:r>
+              <a:rPr lang="fr-FR" sz="1400" dirty="0" smtClean="0"/>
+              <a:t>1.3.2</a:t>
+            </a:r>
+            <a:r>
+              <a:rPr lang="fr-FR" sz="1400" dirty="0" smtClean="0"/>
+              <a:t/>
             </a:r>
             <a:br>
               <a:rPr lang="fr-FR" sz="1400" dirty="0" smtClean="0"/>
@@ -3213,7 +3221,7 @@
             </a:r>
             <a:r>
               <a:rPr lang="fr-FR" sz="1400" dirty="0" smtClean="0"/>
-              <a:t>v1.1</a:t>
+              <a:t>v2.0</a:t>
             </a:r>
             <a:endParaRPr lang="en-US" sz="1400" dirty="0"/>
           </a:p>

</xml_diff>